<commit_message>
started re-writing the docu
</commit_message>
<xml_diff>
--- a/MCS_project_sem_III/python_project.pptx
+++ b/MCS_project_sem_III/python_project.pptx
@@ -292,7 +292,7 @@
           <a:p>
             <a:fld id="{4D804108-0192-4A9F-9F26-4B789C2F2C79}" type="datetimeFigureOut">
               <a:rPr lang="en-US" smtClean="0"/>
-              <a:t>5/7/2019</a:t>
+              <a:t>5/8/2019</a:t>
             </a:fld>
             <a:endParaRPr lang="en-US"/>
           </a:p>
@@ -14676,59 +14676,6 @@
           <a:chExt cx="0" cy="0"/>
         </a:xfrm>
       </p:grpSpPr>
-      <p:pic>
-        <p:nvPicPr>
-          <p:cNvPr id="4" name="Content Placeholder 3"/>
-          <p:cNvPicPr>
-            <a:picLocks noGrp="1" noChangeAspect="1"/>
-          </p:cNvPicPr>
-          <p:nvPr>
-            <p:ph sz="half" idx="2"/>
-          </p:nvPr>
-        </p:nvPicPr>
-        <p:blipFill>
-          <a:blip r:embed="rId2"/>
-          <a:stretch>
-            <a:fillRect/>
-          </a:stretch>
-        </p:blipFill>
-        <p:spPr>
-          <a:xfrm>
-            <a:off x="4692650" y="1329508"/>
-            <a:ext cx="7081838" cy="4364084"/>
-          </a:xfrm>
-          <a:prstGeom prst="rect">
-            <a:avLst/>
-          </a:prstGeom>
-        </p:spPr>
-      </p:pic>
-      <p:sp>
-        <p:nvSpPr>
-          <p:cNvPr id="3" name="Title 2"/>
-          <p:cNvSpPr>
-            <a:spLocks noGrp="1"/>
-          </p:cNvSpPr>
-          <p:nvPr>
-            <p:ph type="title"/>
-          </p:nvPr>
-        </p:nvSpPr>
-        <p:spPr>
-          <a:xfrm>
-            <a:off x="430434" y="3206608"/>
-            <a:ext cx="3270447" cy="443070"/>
-          </a:xfrm>
-        </p:spPr>
-        <p:txBody>
-          <a:bodyPr/>
-          <a:lstStyle/>
-          <a:p>
-            <a:r>
-              <a:rPr lang="en-US" dirty="0"/>
-              <a:t>UiGtm</a:t>
-            </a:r>
-          </a:p>
-        </p:txBody>
-      </p:sp>
     </p:spTree>
     <p:extLst>
       <p:ext uri="{BB962C8B-B14F-4D97-AF65-F5344CB8AC3E}">
@@ -16269,12 +16216,6 @@
               <a:t>What is this project about?</a:t>
             </a:r>
           </a:p>
-          <a:p>
-            <a:r>
-              <a:rPr lang="en-US" dirty="0"/>
-              <a:t>What did I learn in PTC?</a:t>
-            </a:r>
-          </a:p>
         </p:txBody>
       </p:sp>
     </p:spTree>
@@ -18141,7 +18082,7 @@
           <a:p>
             <a:r>
               <a:rPr lang="en-US" dirty="0"/>
-              <a:t>What did I learnt	</a:t>
+              <a:t>What is this project about?</a:t>
             </a:r>
           </a:p>
         </p:txBody>
@@ -18162,62 +18103,24 @@
           <a:lstStyle/>
           <a:p>
             <a:r>
-              <a:rPr lang="en-IN" dirty="0"/>
-              <a:t>1</a:t>
-            </a:r>
-            <a:r>
-              <a:rPr lang="en-US" dirty="0"/>
-              <a:t>8 – relative path</a:t>
-            </a:r>
-          </a:p>
-          <a:p>
-            <a:r>
-              <a:rPr lang="en-IN" dirty="0"/>
-              <a:t>&gt;get values from string</a:t>
-            </a:r>
-          </a:p>
-          <a:p>
-            <a:r>
-              <a:rPr lang="en-IN" dirty="0"/>
-              <a:t>&gt;split that string</a:t>
-            </a:r>
-          </a:p>
-          <a:p>
-            <a:r>
-              <a:rPr lang="en-IN" dirty="0"/>
-              <a:t>&gt;pass split string to the web()</a:t>
-            </a:r>
-          </a:p>
-          <a:p>
-            <a:r>
-              <a:rPr lang="en-IN" dirty="0"/>
-              <a:t>19 – compared the version values dictionary</a:t>
-            </a:r>
-          </a:p>
-          <a:p>
-            <a:r>
-              <a:rPr lang="en-IN" dirty="0"/>
-              <a:t>20 – compared two keys</a:t>
-            </a:r>
-          </a:p>
-          <a:p>
-            <a:r>
-              <a:rPr lang="en-IN" dirty="0"/>
-              <a:t>&gt;cleaned old code</a:t>
-            </a:r>
-          </a:p>
-          <a:p>
-            <a:r>
-              <a:rPr lang="en-IN" dirty="0"/>
-              <a:t>&gt;removed </a:t>
-            </a:r>
-            <a:r>
-              <a:rPr lang="en-IN" dirty="0" err="1"/>
-              <a:t>confirmationMsg</a:t>
-            </a:r>
-            <a:r>
-              <a:rPr lang="en-IN" dirty="0"/>
-              <a:t>()</a:t>
+              <a:rPr lang="en-US" dirty="0"/>
+              <a:t>Machine Learning</a:t>
+            </a:r>
+          </a:p>
+          <a:p>
+            <a:r>
+              <a:rPr lang="en-US" dirty="0"/>
+              <a:t>Automation</a:t>
+            </a:r>
+          </a:p>
+          <a:p>
+            <a:r>
+              <a:rPr lang="en-US" dirty="0" err="1"/>
+              <a:t>Regretion</a:t>
+            </a:r>
+            <a:r>
+              <a:rPr lang="en-US" dirty="0"/>
+              <a:t> tests</a:t>
             </a:r>
           </a:p>
         </p:txBody>

</xml_diff>